<commit_message>
Sensor getAverage für Co2 und waterLevel
</commit_message>
<xml_diff>
--- a/001_Things.pptx
+++ b/001_Things.pptx
@@ -290,7 +290,7 @@
               <a:pPr>
                 <a:defRPr/>
               </a:pPr>
-              <a:t>22.08.2019</a:t>
+              <a:t>23.08.2019</a:t>
             </a:fld>
             <a:endParaRPr lang="de-AT"/>
           </a:p>
@@ -505,7 +505,7 @@
               <a:pPr>
                 <a:defRPr/>
               </a:pPr>
-              <a:t>22.08.2019</a:t>
+              <a:t>23.08.2019</a:t>
             </a:fld>
             <a:endParaRPr lang="de-AT"/>
           </a:p>
@@ -2805,84 +2805,135 @@
           <a:lstStyle/>
           <a:p>
             <a:r>
-              <a:rPr lang="de-DE" sz="2800" dirty="0">
+              <a:rPr lang="de-DE" sz="1600" dirty="0">
                 <a:hlinkClick r:id="rId2"/>
               </a:rPr>
-              <a:t>http://192.168.0.64/getconfig</a:t>
-            </a:r>
-            <a:endParaRPr lang="de-DE" sz="2800" dirty="0"/>
-          </a:p>
-          <a:p>
-            <a:endParaRPr lang="de-DE" sz="2800" dirty="0"/>
-          </a:p>
-          <a:p>
-            <a:r>
-              <a:rPr lang="de-DE" sz="2800" dirty="0">
+              <a:t>http://192.168.0.84/getconfig</a:t>
+            </a:r>
+            <a:endParaRPr lang="de-DE" sz="1600" dirty="0"/>
+          </a:p>
+          <a:p>
+            <a:endParaRPr lang="de-DE" sz="1600" dirty="0"/>
+          </a:p>
+          <a:p>
+            <a:r>
+              <a:rPr lang="de-DE" sz="1600" dirty="0">
                 <a:hlinkClick r:id="rId3"/>
               </a:rPr>
-              <a:t>http://192.168.0.64/setactor?rgbled=010</a:t>
-            </a:r>
-            <a:endParaRPr lang="de-DE" sz="2800" dirty="0"/>
-          </a:p>
-          <a:p>
-            <a:r>
-              <a:rPr lang="de-DE" sz="2800" dirty="0">
+              <a:t>http://192.168.0.84/setconfig?mqttbroker=ssdpi&amp;mqttport=8883</a:t>
+            </a:r>
+            <a:endParaRPr lang="de-DE" sz="1600" dirty="0"/>
+          </a:p>
+          <a:p>
+            <a:r>
+              <a:rPr lang="de-DE" sz="1600" dirty="0">
                 <a:hlinkClick r:id="rId4"/>
               </a:rPr>
-              <a:t>http://192.168.0.64/getsensor?co2</a:t>
-            </a:r>
-            <a:endParaRPr lang="de-DE" sz="2800" dirty="0"/>
-          </a:p>
-          <a:p>
-            <a:r>
-              <a:rPr lang="de-DE" sz="2800" dirty="0">
+              <a:t>http://192.168.0.84/setconfig?mqttuser=openhabian&amp;mqttpassword=piKla87Sie57</a:t>
+            </a:r>
+            <a:r>
+              <a:rPr lang="de-DE" sz="1600" dirty="0"/>
+              <a:t> </a:t>
+            </a:r>
+          </a:p>
+          <a:p>
+            <a:r>
+              <a:rPr lang="de-DE" sz="1600" dirty="0">
                 <a:hlinkClick r:id="rId5"/>
               </a:rPr>
-              <a:t>http://192.168.0.64/getsensor?temperature</a:t>
-            </a:r>
-            <a:endParaRPr lang="de-DE" sz="2800" dirty="0"/>
-          </a:p>
-          <a:p>
-            <a:r>
-              <a:rPr lang="de-DE" sz="2800" dirty="0">
+              <a:t>http://192.168.0.84/setconfig?loggerip=192.168.0.10</a:t>
+            </a:r>
+            <a:r>
+              <a:rPr lang="de-DE" sz="1600" dirty="0"/>
+              <a:t>   </a:t>
+            </a:r>
+          </a:p>
+          <a:p>
+            <a:r>
+              <a:rPr lang="de-DE" sz="1600" dirty="0">
                 <a:hlinkClick r:id="rId6"/>
               </a:rPr>
-              <a:t>http://192.168.0.64/getsensor?humidity</a:t>
-            </a:r>
-            <a:endParaRPr lang="de-DE" sz="2800" dirty="0"/>
-          </a:p>
-          <a:p>
-            <a:r>
-              <a:rPr lang="de-DE" sz="2800" dirty="0">
+              <a:t>http://192.168.0.84/setconfig?thingname=esplivingroom</a:t>
+            </a:r>
+            <a:r>
+              <a:rPr lang="de-DE" sz="1600" dirty="0"/>
+              <a:t> </a:t>
+            </a:r>
+          </a:p>
+          <a:p>
+            <a:endParaRPr lang="de-DE" sz="1600" dirty="0"/>
+          </a:p>
+          <a:p>
+            <a:endParaRPr lang="de-DE" sz="1600" dirty="0"/>
+          </a:p>
+          <a:p>
+            <a:r>
+              <a:rPr lang="de-DE" sz="1600" dirty="0">
                 <a:hlinkClick r:id="rId7"/>
               </a:rPr>
-              <a:t>http://192.168.0.64/getsensor?pir</a:t>
-            </a:r>
-            <a:endParaRPr lang="de-DE" sz="2800" dirty="0"/>
-          </a:p>
-          <a:p>
-            <a:endParaRPr lang="de-DE" sz="2800" dirty="0"/>
-          </a:p>
-          <a:p>
-            <a:endParaRPr lang="de-DE" sz="2800" dirty="0"/>
-          </a:p>
-          <a:p>
-            <a:endParaRPr lang="de-DE" sz="2800" dirty="0"/>
-          </a:p>
-          <a:p>
-            <a:endParaRPr lang="de-DE" sz="2800" dirty="0"/>
+              <a:t>http://192.168.0.84/setactor?rgbled=010</a:t>
+            </a:r>
+            <a:endParaRPr lang="de-DE" sz="1600" dirty="0"/>
+          </a:p>
+          <a:p>
+            <a:r>
+              <a:rPr lang="de-DE" sz="1600" dirty="0">
+                <a:hlinkClick r:id="rId8"/>
+              </a:rPr>
+              <a:t>http://192.168.0.84/getsensor?co2</a:t>
+            </a:r>
+            <a:endParaRPr lang="de-DE" sz="1600" dirty="0"/>
+          </a:p>
+          <a:p>
+            <a:r>
+              <a:rPr lang="de-DE" sz="1600" dirty="0">
+                <a:hlinkClick r:id="rId9"/>
+              </a:rPr>
+              <a:t>http://192.168.0.84/getsensor?temperature</a:t>
+            </a:r>
+            <a:endParaRPr lang="de-DE" sz="1600" dirty="0"/>
+          </a:p>
+          <a:p>
+            <a:r>
+              <a:rPr lang="de-DE" sz="1600" dirty="0">
+                <a:hlinkClick r:id="rId10"/>
+              </a:rPr>
+              <a:t>http://192.168.0.84/getsensor?humidity</a:t>
+            </a:r>
+            <a:endParaRPr lang="de-DE" sz="1600" dirty="0"/>
+          </a:p>
+          <a:p>
+            <a:r>
+              <a:rPr lang="de-DE" sz="1600" dirty="0">
+                <a:hlinkClick r:id="rId11"/>
+              </a:rPr>
+              <a:t>http://192.168.0.84/getsensor?pir</a:t>
+            </a:r>
+            <a:endParaRPr lang="de-DE" sz="1600" dirty="0"/>
+          </a:p>
+          <a:p>
+            <a:endParaRPr lang="de-DE" sz="1600" dirty="0"/>
+          </a:p>
+          <a:p>
+            <a:endParaRPr lang="de-DE" sz="1600" dirty="0"/>
+          </a:p>
+          <a:p>
+            <a:endParaRPr lang="de-DE" sz="1600" dirty="0"/>
+          </a:p>
+          <a:p>
+            <a:endParaRPr lang="de-DE" sz="1600" dirty="0"/>
           </a:p>
           <a:p>
             <a:pPr marL="0" indent="0">
               <a:buNone/>
             </a:pPr>
-            <a:endParaRPr lang="de-DE" sz="2800" dirty="0"/>
-          </a:p>
-          <a:p>
-            <a:endParaRPr lang="de-DE" sz="2800" dirty="0"/>
-          </a:p>
-          <a:p>
-            <a:endParaRPr lang="de-DE" dirty="0"/>
+            <a:endParaRPr lang="de-DE" sz="1600" dirty="0"/>
+          </a:p>
+          <a:p>
+            <a:endParaRPr lang="de-DE" sz="1600" dirty="0"/>
+          </a:p>
+          <a:p>
+            <a:endParaRPr lang="de-DE" sz="1600" dirty="0"/>
           </a:p>
         </p:txBody>
       </p:sp>

</xml_diff>

<commit_message>
Miflora https ohne thing
</commit_message>
<xml_diff>
--- a/001_Things.pptx
+++ b/001_Things.pptx
@@ -291,7 +291,7 @@
               <a:pPr>
                 <a:defRPr/>
               </a:pPr>
-              <a:t>12.09.2019</a:t>
+              <a:t>14.09.2019</a:t>
             </a:fld>
             <a:endParaRPr lang="de-AT"/>
           </a:p>
@@ -506,7 +506,7 @@
               <a:pPr>
                 <a:defRPr/>
               </a:pPr>
-              <a:t>12.09.2019</a:t>
+              <a:t>14.09.2019</a:t>
             </a:fld>
             <a:endParaRPr lang="de-AT"/>
           </a:p>
@@ -2191,19 +2191,12 @@
               <a:rPr lang="de-DE" sz="1600" dirty="0">
                 <a:hlinkClick r:id="rId2"/>
               </a:rPr>
-              <a:t>http://192.168.10.1/setconfig?ssid=linksysAtHome&amp;password</a:t>
-            </a:r>
-            <a:r>
-              <a:rPr lang="de-DE" sz="1600">
-                <a:hlinkClick r:id="rId2"/>
-              </a:rPr>
-              <a:t>=YJXPF4WAC7</a:t>
-            </a:r>
-            <a:r>
-              <a:rPr lang="de-DE" sz="1600"/>
+              <a:t>http://192.168.10.1/setconfig?ssid=linksysAtHome&amp;password=YJXPF4WAC7</a:t>
+            </a:r>
+            <a:r>
+              <a:rPr lang="de-DE" sz="1600" dirty="0"/>
               <a:t> </a:t>
             </a:r>
-            <a:endParaRPr lang="de-DE" sz="1600" dirty="0"/>
           </a:p>
           <a:p>
             <a:r>
@@ -2212,6 +2205,9 @@
               </a:rPr>
               <a:t>http://192.168.10.1/setconfig?ssid=A1-B5035B&amp;password=52809766B6</a:t>
             </a:r>
+            <a:endParaRPr lang="de-DE" sz="1600" dirty="0"/>
+          </a:p>
+          <a:p>
             <a:endParaRPr lang="de-DE" sz="1600" dirty="0"/>
           </a:p>
           <a:p>

</xml_diff>

<commit_message>
https mqtt gateway miflora
</commit_message>
<xml_diff>
--- a/001_Things.pptx
+++ b/001_Things.pptx
@@ -5,10 +5,10 @@
     <p:sldMasterId id="2147483686" r:id="rId1"/>
   </p:sldMasterIdLst>
   <p:notesMasterIdLst>
-    <p:notesMasterId r:id="rId14"/>
+    <p:notesMasterId r:id="rId15"/>
   </p:notesMasterIdLst>
   <p:handoutMasterIdLst>
-    <p:handoutMasterId r:id="rId15"/>
+    <p:handoutMasterId r:id="rId16"/>
   </p:handoutMasterIdLst>
   <p:sldIdLst>
     <p:sldId id="859" r:id="rId2"/>
@@ -20,9 +20,10 @@
     <p:sldId id="875" r:id="rId8"/>
     <p:sldId id="876" r:id="rId9"/>
     <p:sldId id="879" r:id="rId10"/>
-    <p:sldId id="871" r:id="rId11"/>
-    <p:sldId id="872" r:id="rId12"/>
-    <p:sldId id="870" r:id="rId13"/>
+    <p:sldId id="880" r:id="rId11"/>
+    <p:sldId id="871" r:id="rId12"/>
+    <p:sldId id="872" r:id="rId13"/>
+    <p:sldId id="870" r:id="rId14"/>
   </p:sldIdLst>
   <p:sldSz cx="9144000" cy="6858000" type="screen4x3"/>
   <p:notesSz cx="6797675" cy="9926638"/>
@@ -291,7 +292,7 @@
               <a:pPr>
                 <a:defRPr/>
               </a:pPr>
-              <a:t>14.09.2019</a:t>
+              <a:t>22.09.2019</a:t>
             </a:fld>
             <a:endParaRPr lang="de-AT"/>
           </a:p>
@@ -506,7 +507,7 @@
               <a:pPr>
                 <a:defRPr/>
               </a:pPr>
-              <a:t>14.09.2019</a:t>
+              <a:t>22.09.2019</a:t>
             </a:fld>
             <a:endParaRPr lang="de-AT"/>
           </a:p>
@@ -2332,6 +2333,217 @@
           <p:cNvPr id="2" name="Titel 1">
             <a:extLst>
               <a:ext uri="{FF2B5EF4-FFF2-40B4-BE49-F238E27FC236}">
+                <a16:creationId xmlns:a16="http://schemas.microsoft.com/office/drawing/2014/main" id="{17296256-048F-4D15-9FF7-37241709E82B}"/>
+              </a:ext>
+            </a:extLst>
+          </p:cNvPr>
+          <p:cNvSpPr>
+            <a:spLocks noGrp="1"/>
+          </p:cNvSpPr>
+          <p:nvPr>
+            <p:ph type="title"/>
+          </p:nvPr>
+        </p:nvSpPr>
+        <p:spPr/>
+        <p:txBody>
+          <a:bodyPr/>
+          <a:lstStyle/>
+          <a:p>
+            <a:r>
+              <a:rPr lang="de-DE" dirty="0" err="1"/>
+              <a:t>MqttGateway</a:t>
+            </a:r>
+            <a:r>
+              <a:rPr lang="de-DE" dirty="0"/>
+              <a:t> </a:t>
+            </a:r>
+            <a:r>
+              <a:rPr lang="de-DE" dirty="0">
+                <a:sym typeface="Wingdings" panose="05000000000000000000" pitchFamily="2" charset="2"/>
+              </a:rPr>
+              <a:t> </a:t>
+            </a:r>
+            <a:r>
+              <a:rPr lang="de-DE" dirty="0" err="1">
+                <a:sym typeface="Wingdings" panose="05000000000000000000" pitchFamily="2" charset="2"/>
+              </a:rPr>
+              <a:t>MiFlora</a:t>
+            </a:r>
+            <a:endParaRPr lang="de-DE" dirty="0"/>
+          </a:p>
+        </p:txBody>
+      </p:sp>
+      <p:sp>
+        <p:nvSpPr>
+          <p:cNvPr id="3" name="Textplatzhalter 2">
+            <a:extLst>
+              <a:ext uri="{FF2B5EF4-FFF2-40B4-BE49-F238E27FC236}">
+                <a16:creationId xmlns:a16="http://schemas.microsoft.com/office/drawing/2014/main" id="{AE9CEDFF-D8DF-414B-82EC-65DA6495BFAA}"/>
+              </a:ext>
+            </a:extLst>
+          </p:cNvPr>
+          <p:cNvSpPr>
+            <a:spLocks noGrp="1"/>
+          </p:cNvSpPr>
+          <p:nvPr>
+            <p:ph type="body" sz="quarter" idx="10"/>
+          </p:nvPr>
+        </p:nvSpPr>
+        <p:spPr/>
+        <p:txBody>
+          <a:bodyPr/>
+          <a:lstStyle/>
+          <a:p>
+            <a:r>
+              <a:rPr lang="de-DE" sz="1600" dirty="0">
+                <a:hlinkClick r:id="rId2"/>
+              </a:rPr>
+              <a:t>http://192.168.0.60/getconfig</a:t>
+            </a:r>
+            <a:endParaRPr lang="de-DE" sz="1600" dirty="0"/>
+          </a:p>
+          <a:p>
+            <a:endParaRPr lang="de-DE" sz="1600" dirty="0"/>
+          </a:p>
+          <a:p>
+            <a:r>
+              <a:rPr lang="de-DE" sz="1600" dirty="0">
+                <a:hlinkClick r:id="rId3"/>
+              </a:rPr>
+              <a:t>http://192.168.0.60/setconfig?mqttbroker=ssdpi&amp;mqttport=8883</a:t>
+            </a:r>
+            <a:endParaRPr lang="de-DE" sz="1600" dirty="0"/>
+          </a:p>
+          <a:p>
+            <a:r>
+              <a:rPr lang="de-DE" sz="1600" dirty="0">
+                <a:hlinkClick r:id="rId4"/>
+              </a:rPr>
+              <a:t>http://192.168.0.60/setconfig?mqttuser=openhabian&amp;mqttpassword=piKla87Sie57</a:t>
+            </a:r>
+            <a:r>
+              <a:rPr lang="de-DE" sz="1600" dirty="0"/>
+              <a:t> </a:t>
+            </a:r>
+          </a:p>
+          <a:p>
+            <a:endParaRPr lang="de-DE" sz="1600" dirty="0"/>
+          </a:p>
+          <a:p>
+            <a:r>
+              <a:rPr lang="de-DE" sz="1600" dirty="0">
+                <a:hlinkClick r:id="rId5"/>
+              </a:rPr>
+              <a:t>http://192.168.0.60/getconfigvalue?mqttbroker</a:t>
+            </a:r>
+            <a:r>
+              <a:rPr lang="de-DE" sz="1600" dirty="0"/>
+              <a:t> </a:t>
+            </a:r>
+          </a:p>
+          <a:p>
+            <a:r>
+              <a:rPr lang="de-DE" sz="1600" dirty="0">
+                <a:hlinkClick r:id="rId6"/>
+              </a:rPr>
+              <a:t>http://192.168.0.60/getconfigvalue?mqttpassword</a:t>
+            </a:r>
+            <a:r>
+              <a:rPr lang="de-DE" sz="1600" dirty="0"/>
+              <a:t> </a:t>
+            </a:r>
+          </a:p>
+          <a:p>
+            <a:r>
+              <a:rPr lang="de-DE" sz="1600" dirty="0">
+                <a:hlinkClick r:id="rId7"/>
+              </a:rPr>
+              <a:t>http://192.168.0.60/getconfigvalue?mqttport</a:t>
+            </a:r>
+            <a:r>
+              <a:rPr lang="de-DE" sz="1600" dirty="0"/>
+              <a:t> </a:t>
+            </a:r>
+          </a:p>
+          <a:p>
+            <a:r>
+              <a:rPr lang="de-DE" sz="1600" dirty="0">
+                <a:hlinkClick r:id="rId8"/>
+              </a:rPr>
+              <a:t>http://192.168.0.60/getconfigvalue?ssid</a:t>
+            </a:r>
+            <a:r>
+              <a:rPr lang="de-DE" sz="1600" dirty="0"/>
+              <a:t>  </a:t>
+            </a:r>
+          </a:p>
+          <a:p>
+            <a:r>
+              <a:rPr lang="de-DE" sz="1600" dirty="0">
+                <a:hlinkClick r:id="rId9"/>
+              </a:rPr>
+              <a:t>http://192.168.0.60/getconfigvalue?password</a:t>
+            </a:r>
+            <a:r>
+              <a:rPr lang="de-DE" sz="1600" dirty="0"/>
+              <a:t> </a:t>
+            </a:r>
+          </a:p>
+          <a:p>
+            <a:endParaRPr lang="de-DE" sz="1600" dirty="0"/>
+          </a:p>
+          <a:p>
+            <a:endParaRPr lang="de-DE" sz="1600" dirty="0"/>
+          </a:p>
+          <a:p>
+            <a:endParaRPr lang="de-DE" sz="1600" dirty="0"/>
+          </a:p>
+          <a:p>
+            <a:endParaRPr lang="de-DE" sz="1600" dirty="0"/>
+          </a:p>
+          <a:p>
+            <a:endParaRPr lang="de-DE" sz="1600" dirty="0"/>
+          </a:p>
+          <a:p>
+            <a:endParaRPr lang="de-DE" sz="1600" dirty="0"/>
+          </a:p>
+        </p:txBody>
+      </p:sp>
+    </p:spTree>
+    <p:extLst>
+      <p:ext uri="{BB962C8B-B14F-4D97-AF65-F5344CB8AC3E}">
+        <p14:creationId xmlns:p14="http://schemas.microsoft.com/office/powerpoint/2010/main" val="3743503886"/>
+      </p:ext>
+    </p:extLst>
+  </p:cSld>
+  <p:clrMapOvr>
+    <a:masterClrMapping/>
+  </p:clrMapOvr>
+</p:sld>
+</file>
+
+<file path=ppt/slides/slide11.xml><?xml version="1.0" encoding="utf-8"?>
+<p:sld xmlns:a="http://schemas.openxmlformats.org/drawingml/2006/main" xmlns:r="http://schemas.openxmlformats.org/officeDocument/2006/relationships" xmlns:p="http://schemas.openxmlformats.org/presentationml/2006/main">
+  <p:cSld>
+    <p:spTree>
+      <p:nvGrpSpPr>
+        <p:cNvPr id="1" name=""/>
+        <p:cNvGrpSpPr/>
+        <p:nvPr/>
+      </p:nvGrpSpPr>
+      <p:grpSpPr>
+        <a:xfrm>
+          <a:off x="0" y="0"/>
+          <a:ext cx="0" cy="0"/>
+          <a:chOff x="0" y="0"/>
+          <a:chExt cx="0" cy="0"/>
+        </a:xfrm>
+      </p:grpSpPr>
+      <p:sp>
+        <p:nvSpPr>
+          <p:cNvPr id="2" name="Titel 1">
+            <a:extLst>
+              <a:ext uri="{FF2B5EF4-FFF2-40B4-BE49-F238E27FC236}">
                 <a16:creationId xmlns:a16="http://schemas.microsoft.com/office/drawing/2014/main" id="{590F3F6B-2547-4B53-8B03-99A460FB6506}"/>
               </a:ext>
             </a:extLst>
@@ -2574,7 +2786,7 @@
 </p:sld>
 </file>
 
-<file path=ppt/slides/slide11.xml><?xml version="1.0" encoding="utf-8"?>
+<file path=ppt/slides/slide12.xml><?xml version="1.0" encoding="utf-8"?>
 <p:sld xmlns:a="http://schemas.openxmlformats.org/drawingml/2006/main" xmlns:r="http://schemas.openxmlformats.org/officeDocument/2006/relationships" xmlns:p="http://schemas.openxmlformats.org/presentationml/2006/main">
   <p:cSld>
     <p:spTree>
@@ -2705,7 +2917,7 @@
 </p:sld>
 </file>
 
-<file path=ppt/slides/slide12.xml><?xml version="1.0" encoding="utf-8"?>
+<file path=ppt/slides/slide13.xml><?xml version="1.0" encoding="utf-8"?>
 <p:sld xmlns:a="http://schemas.openxmlformats.org/drawingml/2006/main" xmlns:r="http://schemas.openxmlformats.org/officeDocument/2006/relationships" xmlns:p="http://schemas.openxmlformats.org/presentationml/2006/main">
   <p:cSld>
     <p:spTree>

</xml_diff>